<commit_message>
Re-add AUTOSAR Swc demo.
</commit_message>
<xml_diff>
--- a/autosar/ppt/autosar.pptx
+++ b/autosar/ppt/autosar.pptx
@@ -220,7 +220,7 @@
           </a:lstStyle>
           <a:p>
             <a:fld id="{E9A706DE-EC75-4DBE-8555-750196328C04}" type="datetimeFigureOut">
-              <a:t>3/22/2024</a:t>
+              <a:t>10/24/2024</a:t>
             </a:fld>
             <a:endParaRPr lang="en-US"/>
           </a:p>
@@ -16018,7 +16018,7 @@
                 <a:latin typeface="Courier New" panose="02070309020205020404" pitchFamily="49" charset="0"/>
                 <a:cs typeface="Courier New" panose="02070309020205020404" pitchFamily="49" charset="0"/>
               </a:rPr>
-              <a:t>  -o .</a:t>
+              <a:t>  -o </a:t>
             </a:r>
             <a:r>
               <a:rPr lang="en-US" sz="1400" b="1" dirty="0" err="1">
@@ -20480,6 +20480,46 @@
 </file>
 
 <file path=customXml/item1.xml><?xml version="1.0" encoding="utf-8"?>
+<?mso-contentType ?>
+<FormTemplates xmlns="http://schemas.microsoft.com/sharepoint/v3/contenttype/forms">
+  <Display>DocumentLibraryForm</Display>
+  <Edit>DocumentLibraryForm</Edit>
+  <New>DocumentLibraryForm</New>
+</FormTemplates>
+</file>
+
+<file path=customXml/item2.xml><?xml version="1.0" encoding="utf-8"?>
+<p:properties xmlns:p="http://schemas.microsoft.com/office/2006/metadata/properties" xmlns:xsi="http://www.w3.org/2001/XMLSchema-instance" xmlns:pc="http://schemas.microsoft.com/office/infopath/2007/PartnerControls">
+  <documentManagement>
+    <TaxCatchAll xmlns="dc93a133-4a3a-4d44-ad70-bed7ac3b1220" xsi:nil="true"/>
+    <Tag xmlns="ef0ec44c-50f7-4048-bd08-8e4b66c38e2d" xsi:nil="true"/>
+    <Year xmlns="ef0ec44c-50f7-4048-bd08-8e4b66c38e2d" xsi:nil="true"/>
+    <DocType xmlns="ef0ec44c-50f7-4048-bd08-8e4b66c38e2d" xsi:nil="true"/>
+    <lcf76f155ced4ddcb4097134ff3c332f xmlns="ef0ec44c-50f7-4048-bd08-8e4b66c38e2d">
+      <Terms xmlns="http://schemas.microsoft.com/office/infopath/2007/PartnerControls"/>
+    </lcf76f155ced4ddcb4097134ff3c332f>
+    <SharedWithUsers xmlns="dc93a133-4a3a-4d44-ad70-bed7ac3b1220">
+      <UserInfo>
+        <DisplayName>Olivier Korach</DisplayName>
+        <AccountId>13</AccountId>
+        <AccountType/>
+      </UserInfo>
+      <UserInfo>
+        <DisplayName>Vincent Lescaut</DisplayName>
+        <AccountId>26</AccountId>
+        <AccountType/>
+      </UserInfo>
+      <UserInfo>
+        <DisplayName>Jason Landers</DisplayName>
+        <AccountId>31</AccountId>
+        <AccountType/>
+      </UserInfo>
+    </SharedWithUsers>
+  </documentManagement>
+</p:properties>
+</file>
+
+<file path=customXml/item3.xml><?xml version="1.0" encoding="utf-8"?>
 <ct:contentTypeSchema xmlns:ct="http://schemas.microsoft.com/office/2006/metadata/contentType" xmlns:ma="http://schemas.microsoft.com/office/2006/metadata/properties/metaAttributes" ct:_="" ma:_="" ma:contentTypeName="Document" ma:contentTypeID="0x010100B98413815E870646B22F407A97D85002" ma:contentTypeVersion="17" ma:contentTypeDescription="Crée un document." ma:contentTypeScope="" ma:versionID="b27aa19c01e982815f94f98102775798">
   <xsd:schema xmlns:xsd="http://www.w3.org/2001/XMLSchema" xmlns:xs="http://www.w3.org/2001/XMLSchema" xmlns:p="http://schemas.microsoft.com/office/2006/metadata/properties" xmlns:ns2="ef0ec44c-50f7-4048-bd08-8e4b66c38e2d" xmlns:ns3="dc93a133-4a3a-4d44-ad70-bed7ac3b1220" targetNamespace="http://schemas.microsoft.com/office/2006/metadata/properties" ma:root="true" ma:fieldsID="44bb3e10417973e4adae552fe39dc495" ns2:_="" ns3:_="">
     <xsd:import namespace="ef0ec44c-50f7-4048-bd08-8e4b66c38e2d"/>
@@ -20759,47 +20799,26 @@
 </ct:contentTypeSchema>
 </file>
 
-<file path=customXml/item2.xml><?xml version="1.0" encoding="utf-8"?>
-<p:properties xmlns:p="http://schemas.microsoft.com/office/2006/metadata/properties" xmlns:xsi="http://www.w3.org/2001/XMLSchema-instance" xmlns:pc="http://schemas.microsoft.com/office/infopath/2007/PartnerControls">
-  <documentManagement>
-    <TaxCatchAll xmlns="dc93a133-4a3a-4d44-ad70-bed7ac3b1220" xsi:nil="true"/>
-    <Tag xmlns="ef0ec44c-50f7-4048-bd08-8e4b66c38e2d" xsi:nil="true"/>
-    <Year xmlns="ef0ec44c-50f7-4048-bd08-8e4b66c38e2d" xsi:nil="true"/>
-    <DocType xmlns="ef0ec44c-50f7-4048-bd08-8e4b66c38e2d" xsi:nil="true"/>
-    <lcf76f155ced4ddcb4097134ff3c332f xmlns="ef0ec44c-50f7-4048-bd08-8e4b66c38e2d">
-      <Terms xmlns="http://schemas.microsoft.com/office/infopath/2007/PartnerControls"/>
-    </lcf76f155ced4ddcb4097134ff3c332f>
-    <SharedWithUsers xmlns="dc93a133-4a3a-4d44-ad70-bed7ac3b1220">
-      <UserInfo>
-        <DisplayName>Olivier Korach</DisplayName>
-        <AccountId>13</AccountId>
-        <AccountType/>
-      </UserInfo>
-      <UserInfo>
-        <DisplayName>Vincent Lescaut</DisplayName>
-        <AccountId>26</AccountId>
-        <AccountType/>
-      </UserInfo>
-      <UserInfo>
-        <DisplayName>Jason Landers</DisplayName>
-        <AccountId>31</AccountId>
-        <AccountType/>
-      </UserInfo>
-    </SharedWithUsers>
-  </documentManagement>
-</p:properties>
+<file path=customXml/itemProps1.xml><?xml version="1.0" encoding="utf-8"?>
+<ds:datastoreItem xmlns:ds="http://schemas.openxmlformats.org/officeDocument/2006/customXml" ds:itemID="{3C0B9826-9B1A-49CA-BB6C-7C5DA031B24E}">
+  <ds:schemaRefs>
+    <ds:schemaRef ds:uri="http://schemas.microsoft.com/sharepoint/v3/contenttype/forms"/>
+  </ds:schemaRefs>
+</ds:datastoreItem>
 </file>
 
-<file path=customXml/item3.xml><?xml version="1.0" encoding="utf-8"?>
-<?mso-contentType ?>
-<FormTemplates xmlns="http://schemas.microsoft.com/sharepoint/v3/contenttype/forms">
-  <Display>DocumentLibraryForm</Display>
-  <Edit>DocumentLibraryForm</Edit>
-  <New>DocumentLibraryForm</New>
-</FormTemplates>
+<file path=customXml/itemProps2.xml><?xml version="1.0" encoding="utf-8"?>
+<ds:datastoreItem xmlns:ds="http://schemas.openxmlformats.org/officeDocument/2006/customXml" ds:itemID="{CE9C92F8-F07F-4409-8A50-781B279EB508}">
+  <ds:schemaRefs>
+    <ds:schemaRef ds:uri="dc93a133-4a3a-4d44-ad70-bed7ac3b1220"/>
+    <ds:schemaRef ds:uri="ef0ec44c-50f7-4048-bd08-8e4b66c38e2d"/>
+    <ds:schemaRef ds:uri="http://schemas.microsoft.com/office/2006/metadata/properties"/>
+    <ds:schemaRef ds:uri="http://schemas.microsoft.com/office/infopath/2007/PartnerControls"/>
+  </ds:schemaRefs>
+</ds:datastoreItem>
 </file>
 
-<file path=customXml/itemProps1.xml><?xml version="1.0" encoding="utf-8"?>
+<file path=customXml/itemProps3.xml><?xml version="1.0" encoding="utf-8"?>
 <ds:datastoreItem xmlns:ds="http://schemas.openxmlformats.org/officeDocument/2006/customXml" ds:itemID="{A77FF754-3454-4F37-8FF8-26BBC7F9AFE2}">
   <ds:schemaRefs>
     <ds:schemaRef ds:uri="dc93a133-4a3a-4d44-ad70-bed7ac3b1220"/>
@@ -20816,23 +20835,4 @@
     <ds:schemaRef ds:uri="http://www.w3.org/2001/XMLSchema"/>
   </ds:schemaRefs>
 </ds:datastoreItem>
-</file>
-
-<file path=customXml/itemProps2.xml><?xml version="1.0" encoding="utf-8"?>
-<ds:datastoreItem xmlns:ds="http://schemas.openxmlformats.org/officeDocument/2006/customXml" ds:itemID="{CE9C92F8-F07F-4409-8A50-781B279EB508}">
-  <ds:schemaRefs>
-    <ds:schemaRef ds:uri="dc93a133-4a3a-4d44-ad70-bed7ac3b1220"/>
-    <ds:schemaRef ds:uri="ef0ec44c-50f7-4048-bd08-8e4b66c38e2d"/>
-    <ds:schemaRef ds:uri="http://schemas.microsoft.com/office/2006/metadata/properties"/>
-    <ds:schemaRef ds:uri="http://schemas.microsoft.com/office/infopath/2007/PartnerControls"/>
-  </ds:schemaRefs>
-</ds:datastoreItem>
-</file>
-
-<file path=customXml/itemProps3.xml><?xml version="1.0" encoding="utf-8"?>
-<ds:datastoreItem xmlns:ds="http://schemas.openxmlformats.org/officeDocument/2006/customXml" ds:itemID="{3C0B9826-9B1A-49CA-BB6C-7C5DA031B24E}">
-  <ds:schemaRefs>
-    <ds:schemaRef ds:uri="http://schemas.microsoft.com/sharepoint/v3/contenttype/forms"/>
-  </ds:schemaRefs>
-</ds:datastoreItem>
 </file>
</xml_diff>